<commit_message>
Added Luciad screen shot
</commit_message>
<xml_diff>
--- a/airpic.pptx
+++ b/airpic.pptx
@@ -24,12 +24,14 @@
     <p:sldId id="260" r:id="rId18"/>
     <p:sldId id="261" r:id="rId19"/>
     <p:sldId id="263" r:id="rId20"/>
-    <p:sldId id="265" r:id="rId21"/>
-    <p:sldId id="266" r:id="rId22"/>
-    <p:sldId id="267" r:id="rId23"/>
-    <p:sldId id="268" r:id="rId24"/>
-    <p:sldId id="269" r:id="rId25"/>
-    <p:sldId id="264" r:id="rId26"/>
+    <p:sldId id="267" r:id="rId21"/>
+    <p:sldId id="282" r:id="rId22"/>
+    <p:sldId id="265" r:id="rId23"/>
+    <p:sldId id="266" r:id="rId24"/>
+    <p:sldId id="281" r:id="rId25"/>
+    <p:sldId id="268" r:id="rId26"/>
+    <p:sldId id="269" r:id="rId27"/>
+    <p:sldId id="264" r:id="rId28"/>
   </p:sldIdLst>
   <p:sldSz cx="9144000" cy="6858000" type="screen4x3"/>
   <p:notesSz cx="6858000" cy="9144000"/>
@@ -312,7 +314,7 @@
           <a:p>
             <a:fld id="{69910590-D6D2-4333-94C3-CCD900008DA4}" type="datetimeFigureOut">
               <a:rPr lang="en-GB" smtClean="0"/>
-              <a:t>15/11/2015</a:t>
+              <a:t>04/12/2015</a:t>
             </a:fld>
             <a:endParaRPr lang="en-GB"/>
           </a:p>
@@ -482,7 +484,7 @@
           <a:p>
             <a:fld id="{69910590-D6D2-4333-94C3-CCD900008DA4}" type="datetimeFigureOut">
               <a:rPr lang="en-GB" smtClean="0"/>
-              <a:t>15/11/2015</a:t>
+              <a:t>04/12/2015</a:t>
             </a:fld>
             <a:endParaRPr lang="en-GB"/>
           </a:p>
@@ -662,7 +664,7 @@
           <a:p>
             <a:fld id="{69910590-D6D2-4333-94C3-CCD900008DA4}" type="datetimeFigureOut">
               <a:rPr lang="en-GB" smtClean="0"/>
-              <a:t>15/11/2015</a:t>
+              <a:t>04/12/2015</a:t>
             </a:fld>
             <a:endParaRPr lang="en-GB"/>
           </a:p>
@@ -832,7 +834,7 @@
           <a:p>
             <a:fld id="{69910590-D6D2-4333-94C3-CCD900008DA4}" type="datetimeFigureOut">
               <a:rPr lang="en-GB" smtClean="0"/>
-              <a:t>15/11/2015</a:t>
+              <a:t>04/12/2015</a:t>
             </a:fld>
             <a:endParaRPr lang="en-GB"/>
           </a:p>
@@ -1078,7 +1080,7 @@
           <a:p>
             <a:fld id="{69910590-D6D2-4333-94C3-CCD900008DA4}" type="datetimeFigureOut">
               <a:rPr lang="en-GB" smtClean="0"/>
-              <a:t>15/11/2015</a:t>
+              <a:t>04/12/2015</a:t>
             </a:fld>
             <a:endParaRPr lang="en-GB"/>
           </a:p>
@@ -1366,7 +1368,7 @@
           <a:p>
             <a:fld id="{69910590-D6D2-4333-94C3-CCD900008DA4}" type="datetimeFigureOut">
               <a:rPr lang="en-GB" smtClean="0"/>
-              <a:t>15/11/2015</a:t>
+              <a:t>04/12/2015</a:t>
             </a:fld>
             <a:endParaRPr lang="en-GB"/>
           </a:p>
@@ -1788,7 +1790,7 @@
           <a:p>
             <a:fld id="{69910590-D6D2-4333-94C3-CCD900008DA4}" type="datetimeFigureOut">
               <a:rPr lang="en-GB" smtClean="0"/>
-              <a:t>15/11/2015</a:t>
+              <a:t>04/12/2015</a:t>
             </a:fld>
             <a:endParaRPr lang="en-GB"/>
           </a:p>
@@ -1906,7 +1908,7 @@
           <a:p>
             <a:fld id="{69910590-D6D2-4333-94C3-CCD900008DA4}" type="datetimeFigureOut">
               <a:rPr lang="en-GB" smtClean="0"/>
-              <a:t>15/11/2015</a:t>
+              <a:t>04/12/2015</a:t>
             </a:fld>
             <a:endParaRPr lang="en-GB"/>
           </a:p>
@@ -2001,7 +2003,7 @@
           <a:p>
             <a:fld id="{69910590-D6D2-4333-94C3-CCD900008DA4}" type="datetimeFigureOut">
               <a:rPr lang="en-GB" smtClean="0"/>
-              <a:t>15/11/2015</a:t>
+              <a:t>04/12/2015</a:t>
             </a:fld>
             <a:endParaRPr lang="en-GB"/>
           </a:p>
@@ -2278,7 +2280,7 @@
           <a:p>
             <a:fld id="{69910590-D6D2-4333-94C3-CCD900008DA4}" type="datetimeFigureOut">
               <a:rPr lang="en-GB" smtClean="0"/>
-              <a:t>15/11/2015</a:t>
+              <a:t>04/12/2015</a:t>
             </a:fld>
             <a:endParaRPr lang="en-GB"/>
           </a:p>
@@ -2531,7 +2533,7 @@
           <a:p>
             <a:fld id="{69910590-D6D2-4333-94C3-CCD900008DA4}" type="datetimeFigureOut">
               <a:rPr lang="en-GB" smtClean="0"/>
-              <a:t>15/11/2015</a:t>
+              <a:t>04/12/2015</a:t>
             </a:fld>
             <a:endParaRPr lang="en-GB"/>
           </a:p>
@@ -2744,7 +2746,7 @@
           <a:p>
             <a:fld id="{69910590-D6D2-4333-94C3-CCD900008DA4}" type="datetimeFigureOut">
               <a:rPr lang="en-GB" smtClean="0"/>
-              <a:t>15/11/2015</a:t>
+              <a:t>04/12/2015</a:t>
             </a:fld>
             <a:endParaRPr lang="en-GB"/>
           </a:p>
@@ -3975,11 +3977,7 @@
             </a:r>
             <a:r>
               <a:rPr lang="en-GB" dirty="0" smtClean="0"/>
-              <a:t> </a:t>
-            </a:r>
-            <a:r>
-              <a:rPr lang="en-GB" dirty="0" smtClean="0"/>
-              <a:t>(minimal code)</a:t>
+              <a:t> (minimal code)</a:t>
             </a:r>
             <a:endParaRPr lang="en-GB" dirty="0"/>
           </a:p>
@@ -5587,49 +5585,104 @@
             <a:spLocks noGrp="1"/>
           </p:cNvSpPr>
           <p:nvPr>
-            <p:ph type="ctrTitle"/>
+            <p:ph type="title"/>
           </p:nvPr>
         </p:nvSpPr>
         <p:spPr/>
         <p:txBody>
-          <a:bodyPr/>
-          <a:lstStyle/>
-          <a:p>
+          <a:bodyPr>
+            <a:normAutofit fontScale="90000"/>
+          </a:bodyPr>
+          <a:lstStyle/>
+          <a:p>
+            <a:r>
+              <a:rPr lang="en-GB" dirty="0" smtClean="0"/>
+              <a:t>Teething Troubles – </a:t>
+            </a:r>
             <a:r>
               <a:rPr lang="en-GB" dirty="0" err="1" smtClean="0"/>
-              <a:t>SpatialLite</a:t>
+              <a:t>Luciad</a:t>
             </a:r>
             <a:r>
               <a:rPr lang="en-GB" dirty="0" smtClean="0"/>
-              <a:t> Android</a:t>
+              <a:t> GPKG in </a:t>
+            </a:r>
+            <a:r>
+              <a:rPr lang="en-GB" dirty="0" err="1" smtClean="0"/>
+              <a:t>OpenLayers</a:t>
+            </a:r>
+            <a:r>
+              <a:rPr lang="en-GB" dirty="0" smtClean="0"/>
+              <a:t>/</a:t>
+            </a:r>
+            <a:r>
+              <a:rPr lang="en-GB" dirty="0" err="1" smtClean="0"/>
+              <a:t>Geoserver</a:t>
             </a:r>
             <a:endParaRPr lang="en-GB" dirty="0"/>
           </a:p>
         </p:txBody>
       </p:sp>
-      <p:sp>
-        <p:nvSpPr>
-          <p:cNvPr id="3" name="Subtitle 2"/>
-          <p:cNvSpPr>
-            <a:spLocks noGrp="1"/>
-          </p:cNvSpPr>
-          <p:nvPr>
-            <p:ph type="subTitle" idx="1"/>
-          </p:nvPr>
-        </p:nvSpPr>
-        <p:spPr/>
-        <p:txBody>
-          <a:bodyPr/>
-          <a:lstStyle/>
-          <a:p>
-            <a:endParaRPr lang="en-GB"/>
-          </a:p>
-        </p:txBody>
-      </p:sp>
+      <p:pic>
+        <p:nvPicPr>
+          <p:cNvPr id="1026" name="Picture 2"/>
+          <p:cNvPicPr>
+            <a:picLocks noGrp="1" noChangeAspect="1" noChangeArrowheads="1"/>
+          </p:cNvPicPr>
+          <p:nvPr>
+            <p:ph idx="1"/>
+          </p:nvPr>
+        </p:nvPicPr>
+        <p:blipFill>
+          <a:blip r:embed="rId2">
+            <a:extLst>
+              <a:ext uri="{28A0092B-C50C-407E-A947-70E740481C1C}">
+                <a14:useLocalDpi xmlns:a14="http://schemas.microsoft.com/office/drawing/2010/main" val="0"/>
+              </a:ext>
+            </a:extLst>
+          </a:blip>
+          <a:srcRect/>
+          <a:stretch>
+            <a:fillRect/>
+          </a:stretch>
+        </p:blipFill>
+        <p:spPr bwMode="auto">
+          <a:xfrm>
+            <a:off x="535538" y="1600200"/>
+            <a:ext cx="8072923" cy="4525963"/>
+          </a:xfrm>
+          <a:prstGeom prst="rect">
+            <a:avLst/>
+          </a:prstGeom>
+          <a:noFill/>
+          <a:ln>
+            <a:noFill/>
+          </a:ln>
+          <a:extLst>
+            <a:ext uri="{909E8E84-426E-40DD-AFC4-6F175D3DCCD1}">
+              <a14:hiddenFill xmlns:a14="http://schemas.microsoft.com/office/drawing/2010/main">
+                <a:solidFill>
+                  <a:schemeClr val="accent1"/>
+                </a:solidFill>
+              </a14:hiddenFill>
+            </a:ext>
+            <a:ext uri="{91240B29-F687-4F45-9708-019B960494DF}">
+              <a14:hiddenLine xmlns:a14="http://schemas.microsoft.com/office/drawing/2010/main" w="9525">
+                <a:solidFill>
+                  <a:schemeClr val="tx1"/>
+                </a:solidFill>
+                <a:miter lim="800000"/>
+                <a:headEnd/>
+                <a:tailEnd/>
+              </a14:hiddenLine>
+            </a:ext>
+          </a:extLst>
+        </p:spPr>
+      </p:pic>
     </p:spTree>
     <p:extLst>
       <p:ext uri="{BB962C8B-B14F-4D97-AF65-F5344CB8AC3E}">
-        <p14:creationId xmlns:p14="http://schemas.microsoft.com/office/powerpoint/2010/main" val="4196412464"/>
+        <p14:creationId xmlns:p14="http://schemas.microsoft.com/office/powerpoint/2010/main" val="461242641"/>
       </p:ext>
     </p:extLst>
   </p:cSld>
@@ -5666,58 +5719,116 @@
             <p:ph type="title"/>
           </p:nvPr>
         </p:nvSpPr>
-        <p:spPr/>
-        <p:txBody>
-          <a:bodyPr/>
-          <a:lstStyle/>
-          <a:p>
-            <a:r>
-              <a:rPr lang="en-GB" dirty="0" smtClean="0"/>
-              <a:t>Install Eclipse Android Plugin</a:t>
-            </a:r>
-            <a:endParaRPr lang="en-GB" dirty="0"/>
-          </a:p>
-        </p:txBody>
-      </p:sp>
-      <p:sp>
-        <p:nvSpPr>
-          <p:cNvPr id="3" name="Content Placeholder 2"/>
-          <p:cNvSpPr>
-            <a:spLocks noGrp="1"/>
-          </p:cNvSpPr>
-          <p:nvPr>
-            <p:ph idx="1"/>
-          </p:nvPr>
-        </p:nvSpPr>
-        <p:spPr/>
-        <p:txBody>
-          <a:bodyPr/>
-          <a:lstStyle/>
-          <a:p>
-            <a:r>
-              <a:rPr lang="en-GB" dirty="0" smtClean="0"/>
-              <a:t>Install Android SDK</a:t>
-            </a:r>
-          </a:p>
-          <a:p>
-            <a:r>
-              <a:rPr lang="en-GB" dirty="0" smtClean="0"/>
-              <a:t>Install Eclipse</a:t>
-            </a:r>
-          </a:p>
-          <a:p>
-            <a:r>
-              <a:rPr lang="en-GB" dirty="0" smtClean="0"/>
-              <a:t>Install Android Developer Plugin</a:t>
-            </a:r>
-            <a:endParaRPr lang="en-GB" dirty="0"/>
-          </a:p>
-        </p:txBody>
-      </p:sp>
+        <p:spPr>
+          <a:xfrm>
+            <a:off x="381000" y="304800"/>
+            <a:ext cx="8229600" cy="1143000"/>
+          </a:xfrm>
+        </p:spPr>
+        <p:txBody>
+          <a:bodyPr>
+            <a:normAutofit/>
+          </a:bodyPr>
+          <a:lstStyle/>
+          <a:p>
+            <a:r>
+              <a:rPr lang="en-GB" sz="3200" dirty="0" smtClean="0"/>
+              <a:t>Teething Troubles – </a:t>
+            </a:r>
+            <a:r>
+              <a:rPr lang="en-GB" sz="3200" dirty="0" err="1" smtClean="0"/>
+              <a:t>Luciad</a:t>
+            </a:r>
+            <a:r>
+              <a:rPr lang="en-GB" sz="3200" dirty="0" smtClean="0"/>
+              <a:t> GPKG in </a:t>
+            </a:r>
+            <a:r>
+              <a:rPr lang="en-GB" sz="3200" dirty="0" err="1" smtClean="0"/>
+              <a:t>OpenLayers</a:t>
+            </a:r>
+            <a:r>
+              <a:rPr lang="en-GB" sz="3200" dirty="0" smtClean="0"/>
+              <a:t>/</a:t>
+            </a:r>
+            <a:r>
+              <a:rPr lang="en-GB" sz="3200" dirty="0" err="1" smtClean="0"/>
+              <a:t>Geoserver</a:t>
+            </a:r>
+            <a:r>
+              <a:rPr lang="en-GB" sz="3200" dirty="0" smtClean="0"/>
+              <a:t> – Antarctic </a:t>
+            </a:r>
+            <a:r>
+              <a:rPr lang="en-GB" sz="3200" dirty="0" err="1" smtClean="0"/>
+              <a:t>Notams</a:t>
+            </a:r>
+            <a:r>
+              <a:rPr lang="en-GB" sz="3200" dirty="0" smtClean="0"/>
+              <a:t>!</a:t>
+            </a:r>
+            <a:endParaRPr lang="en-GB" sz="3200" dirty="0"/>
+          </a:p>
+        </p:txBody>
+      </p:sp>
+      <p:pic>
+        <p:nvPicPr>
+          <p:cNvPr id="2051" name="Picture 3"/>
+          <p:cNvPicPr>
+            <a:picLocks noChangeAspect="1" noChangeArrowheads="1"/>
+          </p:cNvPicPr>
+          <p:nvPr/>
+        </p:nvPicPr>
+        <p:blipFill>
+          <a:blip r:embed="rId2">
+            <a:extLst>
+              <a:ext uri="{28A0092B-C50C-407E-A947-70E740481C1C}">
+                <a14:useLocalDpi xmlns:a14="http://schemas.microsoft.com/office/drawing/2010/main" val="0"/>
+              </a:ext>
+            </a:extLst>
+          </a:blip>
+          <a:srcRect/>
+          <a:stretch>
+            <a:fillRect/>
+          </a:stretch>
+        </p:blipFill>
+        <p:spPr bwMode="auto">
+          <a:xfrm>
+            <a:off x="1447800" y="1577444"/>
+            <a:ext cx="5715000" cy="4872852"/>
+          </a:xfrm>
+          <a:prstGeom prst="rect">
+            <a:avLst/>
+          </a:prstGeom>
+          <a:noFill/>
+          <a:ln>
+            <a:noFill/>
+          </a:ln>
+          <a:extLst>
+            <a:ext uri="{909E8E84-426E-40DD-AFC4-6F175D3DCCD1}">
+              <a14:hiddenFill xmlns:a14="http://schemas.microsoft.com/office/drawing/2010/main">
+                <a:solidFill>
+                  <a:schemeClr val="accent1"/>
+                </a:solidFill>
+              </a14:hiddenFill>
+            </a:ext>
+            <a:ext uri="{91240B29-F687-4F45-9708-019B960494DF}">
+              <a14:hiddenLine xmlns:a14="http://schemas.microsoft.com/office/drawing/2010/main" w="9525">
+                <a:solidFill>
+                  <a:schemeClr val="tx1"/>
+                </a:solidFill>
+                <a:miter lim="800000"/>
+                <a:headEnd/>
+                <a:tailEnd/>
+              </a14:hiddenLine>
+            </a:ext>
+          </a:extLst>
+        </p:spPr>
+      </p:pic>
     </p:spTree>
     <p:extLst>
       <p:ext uri="{BB962C8B-B14F-4D97-AF65-F5344CB8AC3E}">
-        <p14:creationId xmlns:p14="http://schemas.microsoft.com/office/powerpoint/2010/main" val="3190041263"/>
+        <p14:creationId xmlns:p14="http://schemas.microsoft.com/office/powerpoint/2010/main" val="1540293275"/>
       </p:ext>
     </p:extLst>
   </p:cSld>
@@ -5751,7 +5862,7 @@
             <a:spLocks noGrp="1"/>
           </p:cNvSpPr>
           <p:nvPr>
-            <p:ph type="title"/>
+            <p:ph type="ctrTitle"/>
           </p:nvPr>
         </p:nvSpPr>
         <p:spPr/>
@@ -5760,8 +5871,12 @@
           <a:lstStyle/>
           <a:p>
             <a:r>
+              <a:rPr lang="en-GB" dirty="0" err="1" smtClean="0"/>
+              <a:t>SpatialLite</a:t>
+            </a:r>
+            <a:r>
               <a:rPr lang="en-GB" dirty="0" smtClean="0"/>
-              <a:t>Create Android Project</a:t>
+              <a:t> Android</a:t>
             </a:r>
             <a:endParaRPr lang="en-GB" dirty="0"/>
           </a:p>
@@ -5769,12 +5884,12 @@
       </p:sp>
       <p:sp>
         <p:nvSpPr>
-          <p:cNvPr id="3" name="Content Placeholder 2"/>
-          <p:cNvSpPr>
-            <a:spLocks noGrp="1"/>
-          </p:cNvSpPr>
-          <p:nvPr>
-            <p:ph idx="1"/>
+          <p:cNvPr id="3" name="Subtitle 2"/>
+          <p:cNvSpPr>
+            <a:spLocks noGrp="1"/>
+          </p:cNvSpPr>
+          <p:nvPr>
+            <p:ph type="subTitle" idx="1"/>
           </p:nvPr>
         </p:nvSpPr>
         <p:spPr/>
@@ -5789,7 +5904,7 @@
     </p:spTree>
     <p:extLst>
       <p:ext uri="{BB962C8B-B14F-4D97-AF65-F5344CB8AC3E}">
-        <p14:creationId xmlns:p14="http://schemas.microsoft.com/office/powerpoint/2010/main" val="461242641"/>
+        <p14:creationId xmlns:p14="http://schemas.microsoft.com/office/powerpoint/2010/main" val="4196412464"/>
       </p:ext>
     </p:extLst>
   </p:cSld>
@@ -5833,38 +5948,42 @@
           <a:p>
             <a:r>
               <a:rPr lang="en-GB" dirty="0" smtClean="0"/>
-              <a:t>Copy In the </a:t>
-            </a:r>
-            <a:r>
-              <a:rPr lang="en-GB" dirty="0" err="1" smtClean="0"/>
-              <a:t>SpatiaLite</a:t>
-            </a:r>
+              <a:t>Install Eclipse Android Plugin</a:t>
+            </a:r>
+            <a:endParaRPr lang="en-GB" dirty="0"/>
+          </a:p>
+        </p:txBody>
+      </p:sp>
+      <p:sp>
+        <p:nvSpPr>
+          <p:cNvPr id="3" name="Content Placeholder 2"/>
+          <p:cNvSpPr>
+            <a:spLocks noGrp="1"/>
+          </p:cNvSpPr>
+          <p:nvPr>
+            <p:ph idx="1"/>
+          </p:nvPr>
+        </p:nvSpPr>
+        <p:spPr/>
+        <p:txBody>
+          <a:bodyPr/>
+          <a:lstStyle/>
+          <a:p>
             <a:r>
               <a:rPr lang="en-GB" dirty="0" smtClean="0"/>
-              <a:t> Library</a:t>
-            </a:r>
-            <a:endParaRPr lang="en-GB" dirty="0"/>
-          </a:p>
-        </p:txBody>
-      </p:sp>
-      <p:sp>
-        <p:nvSpPr>
-          <p:cNvPr id="3" name="Content Placeholder 2"/>
-          <p:cNvSpPr>
-            <a:spLocks noGrp="1"/>
-          </p:cNvSpPr>
-          <p:nvPr>
-            <p:ph idx="1"/>
-          </p:nvPr>
-        </p:nvSpPr>
-        <p:spPr/>
-        <p:txBody>
-          <a:bodyPr/>
-          <a:lstStyle/>
+              <a:t>Install Android SDK</a:t>
+            </a:r>
+          </a:p>
           <a:p>
             <a:r>
               <a:rPr lang="en-GB" dirty="0" smtClean="0"/>
-              <a:t>To the libs folder</a:t>
+              <a:t>Install Eclipse</a:t>
+            </a:r>
+          </a:p>
+          <a:p>
+            <a:r>
+              <a:rPr lang="en-GB" dirty="0" smtClean="0"/>
+              <a:t>Install Android Developer Plugin</a:t>
             </a:r>
             <a:endParaRPr lang="en-GB" dirty="0"/>
           </a:p>
@@ -5873,7 +5992,7 @@
     </p:spTree>
     <p:extLst>
       <p:ext uri="{BB962C8B-B14F-4D97-AF65-F5344CB8AC3E}">
-        <p14:creationId xmlns:p14="http://schemas.microsoft.com/office/powerpoint/2010/main" val="833365000"/>
+        <p14:creationId xmlns:p14="http://schemas.microsoft.com/office/powerpoint/2010/main" val="3190041263"/>
       </p:ext>
     </p:extLst>
   </p:cSld>
@@ -5917,6 +6036,162 @@
           <a:p>
             <a:r>
               <a:rPr lang="en-GB" dirty="0" smtClean="0"/>
+              <a:t>Create Android Project</a:t>
+            </a:r>
+            <a:endParaRPr lang="en-GB" dirty="0"/>
+          </a:p>
+        </p:txBody>
+      </p:sp>
+      <p:sp>
+        <p:nvSpPr>
+          <p:cNvPr id="3" name="Content Placeholder 2"/>
+          <p:cNvSpPr>
+            <a:spLocks noGrp="1"/>
+          </p:cNvSpPr>
+          <p:nvPr>
+            <p:ph idx="1"/>
+          </p:nvPr>
+        </p:nvSpPr>
+        <p:spPr/>
+        <p:txBody>
+          <a:bodyPr/>
+          <a:lstStyle/>
+          <a:p>
+            <a:endParaRPr lang="en-GB"/>
+          </a:p>
+        </p:txBody>
+      </p:sp>
+    </p:spTree>
+    <p:extLst>
+      <p:ext uri="{BB962C8B-B14F-4D97-AF65-F5344CB8AC3E}">
+        <p14:creationId xmlns:p14="http://schemas.microsoft.com/office/powerpoint/2010/main" val="2145127170"/>
+      </p:ext>
+    </p:extLst>
+  </p:cSld>
+  <p:clrMapOvr>
+    <a:masterClrMapping/>
+  </p:clrMapOvr>
+</p:sld>
+</file>
+
+<file path=ppt/slides/slide25.xml><?xml version="1.0" encoding="utf-8"?>
+<p:sld xmlns:a="http://schemas.openxmlformats.org/drawingml/2006/main" xmlns:r="http://schemas.openxmlformats.org/officeDocument/2006/relationships" xmlns:p="http://schemas.openxmlformats.org/presentationml/2006/main">
+  <p:cSld>
+    <p:spTree>
+      <p:nvGrpSpPr>
+        <p:cNvPr id="1" name=""/>
+        <p:cNvGrpSpPr/>
+        <p:nvPr/>
+      </p:nvGrpSpPr>
+      <p:grpSpPr>
+        <a:xfrm>
+          <a:off x="0" y="0"/>
+          <a:ext cx="0" cy="0"/>
+          <a:chOff x="0" y="0"/>
+          <a:chExt cx="0" cy="0"/>
+        </a:xfrm>
+      </p:grpSpPr>
+      <p:sp>
+        <p:nvSpPr>
+          <p:cNvPr id="2" name="Title 1"/>
+          <p:cNvSpPr>
+            <a:spLocks noGrp="1"/>
+          </p:cNvSpPr>
+          <p:nvPr>
+            <p:ph type="title"/>
+          </p:nvPr>
+        </p:nvSpPr>
+        <p:spPr/>
+        <p:txBody>
+          <a:bodyPr/>
+          <a:lstStyle/>
+          <a:p>
+            <a:r>
+              <a:rPr lang="en-GB" dirty="0" smtClean="0"/>
+              <a:t>Copy In the </a:t>
+            </a:r>
+            <a:r>
+              <a:rPr lang="en-GB" dirty="0" err="1" smtClean="0"/>
+              <a:t>SpatiaLite</a:t>
+            </a:r>
+            <a:r>
+              <a:rPr lang="en-GB" dirty="0" smtClean="0"/>
+              <a:t> Library</a:t>
+            </a:r>
+            <a:endParaRPr lang="en-GB" dirty="0"/>
+          </a:p>
+        </p:txBody>
+      </p:sp>
+      <p:sp>
+        <p:nvSpPr>
+          <p:cNvPr id="3" name="Content Placeholder 2"/>
+          <p:cNvSpPr>
+            <a:spLocks noGrp="1"/>
+          </p:cNvSpPr>
+          <p:nvPr>
+            <p:ph idx="1"/>
+          </p:nvPr>
+        </p:nvSpPr>
+        <p:spPr/>
+        <p:txBody>
+          <a:bodyPr/>
+          <a:lstStyle/>
+          <a:p>
+            <a:r>
+              <a:rPr lang="en-GB" dirty="0" smtClean="0"/>
+              <a:t>To the libs folder</a:t>
+            </a:r>
+            <a:endParaRPr lang="en-GB" dirty="0"/>
+          </a:p>
+        </p:txBody>
+      </p:sp>
+    </p:spTree>
+    <p:extLst>
+      <p:ext uri="{BB962C8B-B14F-4D97-AF65-F5344CB8AC3E}">
+        <p14:creationId xmlns:p14="http://schemas.microsoft.com/office/powerpoint/2010/main" val="833365000"/>
+      </p:ext>
+    </p:extLst>
+  </p:cSld>
+  <p:clrMapOvr>
+    <a:masterClrMapping/>
+  </p:clrMapOvr>
+</p:sld>
+</file>
+
+<file path=ppt/slides/slide26.xml><?xml version="1.0" encoding="utf-8"?>
+<p:sld xmlns:a="http://schemas.openxmlformats.org/drawingml/2006/main" xmlns:r="http://schemas.openxmlformats.org/officeDocument/2006/relationships" xmlns:p="http://schemas.openxmlformats.org/presentationml/2006/main">
+  <p:cSld>
+    <p:spTree>
+      <p:nvGrpSpPr>
+        <p:cNvPr id="1" name=""/>
+        <p:cNvGrpSpPr/>
+        <p:nvPr/>
+      </p:nvGrpSpPr>
+      <p:grpSpPr>
+        <a:xfrm>
+          <a:off x="0" y="0"/>
+          <a:ext cx="0" cy="0"/>
+          <a:chOff x="0" y="0"/>
+          <a:chExt cx="0" cy="0"/>
+        </a:xfrm>
+      </p:grpSpPr>
+      <p:sp>
+        <p:nvSpPr>
+          <p:cNvPr id="2" name="Title 1"/>
+          <p:cNvSpPr>
+            <a:spLocks noGrp="1"/>
+          </p:cNvSpPr>
+          <p:nvPr>
+            <p:ph type="title"/>
+          </p:nvPr>
+        </p:nvSpPr>
+        <p:spPr/>
+        <p:txBody>
+          <a:bodyPr/>
+          <a:lstStyle/>
+          <a:p>
+            <a:r>
+              <a:rPr lang="en-GB" dirty="0" smtClean="0"/>
               <a:t>Gain Inspiration</a:t>
             </a:r>
             <a:endParaRPr lang="en-GB" dirty="0"/>
@@ -5959,7 +6234,7 @@
 </p:sld>
 </file>
 
-<file path=ppt/slides/slide25.xml><?xml version="1.0" encoding="utf-8"?>
+<file path=ppt/slides/slide27.xml><?xml version="1.0" encoding="utf-8"?>
 <p:sld xmlns:a="http://schemas.openxmlformats.org/drawingml/2006/main" xmlns:r="http://schemas.openxmlformats.org/officeDocument/2006/relationships" xmlns:p="http://schemas.openxmlformats.org/presentationml/2006/main">
   <p:cSld>
     <p:spTree>
@@ -7256,19 +7531,7 @@
           <a:p>
             <a:r>
               <a:rPr lang="en-GB" dirty="0" smtClean="0"/>
-              <a:t>Select </a:t>
-            </a:r>
-            <a:r>
-              <a:rPr lang="en-GB" dirty="0" smtClean="0"/>
-              <a:t>Raster </a:t>
-            </a:r>
-            <a:r>
-              <a:rPr lang="en-GB" dirty="0" smtClean="0"/>
-              <a:t>and </a:t>
-            </a:r>
-            <a:r>
-              <a:rPr lang="en-GB" dirty="0" smtClean="0"/>
-              <a:t> Vector Layers</a:t>
+              <a:t>Select Raster and  Vector Layers</a:t>
             </a:r>
             <a:endParaRPr lang="en-GB" dirty="0"/>
           </a:p>

</xml_diff>